<commit_message>
modificacion del login + proveedores
</commit_message>
<xml_diff>
--- a/mapaprimerafase.pptx
+++ b/mapaprimerafase.pptx
@@ -288,7 +288,7 @@
           <a:p>
             <a:fld id="{3FA26C60-B539-465E-BE53-469D770FD957}" type="datetimeFigureOut">
               <a:rPr lang="ru-RU" smtClean="0"/>
-              <a:t>17.09.2018</a:t>
+              <a:t>20.09.2018</a:t>
             </a:fld>
             <a:endParaRPr lang="ru-RU"/>
           </a:p>
@@ -458,7 +458,7 @@
           <a:p>
             <a:fld id="{3FA26C60-B539-465E-BE53-469D770FD957}" type="datetimeFigureOut">
               <a:rPr lang="ru-RU" smtClean="0"/>
-              <a:t>17.09.2018</a:t>
+              <a:t>20.09.2018</a:t>
             </a:fld>
             <a:endParaRPr lang="ru-RU"/>
           </a:p>
@@ -638,7 +638,7 @@
           <a:p>
             <a:fld id="{3FA26C60-B539-465E-BE53-469D770FD957}" type="datetimeFigureOut">
               <a:rPr lang="ru-RU" smtClean="0"/>
-              <a:t>17.09.2018</a:t>
+              <a:t>20.09.2018</a:t>
             </a:fld>
             <a:endParaRPr lang="ru-RU"/>
           </a:p>
@@ -808,7 +808,7 @@
           <a:p>
             <a:fld id="{3FA26C60-B539-465E-BE53-469D770FD957}" type="datetimeFigureOut">
               <a:rPr lang="ru-RU" smtClean="0"/>
-              <a:t>17.09.2018</a:t>
+              <a:t>20.09.2018</a:t>
             </a:fld>
             <a:endParaRPr lang="ru-RU"/>
           </a:p>
@@ -1054,7 +1054,7 @@
           <a:p>
             <a:fld id="{3FA26C60-B539-465E-BE53-469D770FD957}" type="datetimeFigureOut">
               <a:rPr lang="ru-RU" smtClean="0"/>
-              <a:t>17.09.2018</a:t>
+              <a:t>20.09.2018</a:t>
             </a:fld>
             <a:endParaRPr lang="ru-RU"/>
           </a:p>
@@ -1342,7 +1342,7 @@
           <a:p>
             <a:fld id="{3FA26C60-B539-465E-BE53-469D770FD957}" type="datetimeFigureOut">
               <a:rPr lang="ru-RU" smtClean="0"/>
-              <a:t>17.09.2018</a:t>
+              <a:t>20.09.2018</a:t>
             </a:fld>
             <a:endParaRPr lang="ru-RU"/>
           </a:p>
@@ -1764,7 +1764,7 @@
           <a:p>
             <a:fld id="{3FA26C60-B539-465E-BE53-469D770FD957}" type="datetimeFigureOut">
               <a:rPr lang="ru-RU" smtClean="0"/>
-              <a:t>17.09.2018</a:t>
+              <a:t>20.09.2018</a:t>
             </a:fld>
             <a:endParaRPr lang="ru-RU"/>
           </a:p>
@@ -1882,7 +1882,7 @@
           <a:p>
             <a:fld id="{3FA26C60-B539-465E-BE53-469D770FD957}" type="datetimeFigureOut">
               <a:rPr lang="ru-RU" smtClean="0"/>
-              <a:t>17.09.2018</a:t>
+              <a:t>20.09.2018</a:t>
             </a:fld>
             <a:endParaRPr lang="ru-RU"/>
           </a:p>
@@ -1977,7 +1977,7 @@
           <a:p>
             <a:fld id="{3FA26C60-B539-465E-BE53-469D770FD957}" type="datetimeFigureOut">
               <a:rPr lang="ru-RU" smtClean="0"/>
-              <a:t>17.09.2018</a:t>
+              <a:t>20.09.2018</a:t>
             </a:fld>
             <a:endParaRPr lang="ru-RU"/>
           </a:p>
@@ -2254,7 +2254,7 @@
           <a:p>
             <a:fld id="{3FA26C60-B539-465E-BE53-469D770FD957}" type="datetimeFigureOut">
               <a:rPr lang="ru-RU" smtClean="0"/>
-              <a:t>17.09.2018</a:t>
+              <a:t>20.09.2018</a:t>
             </a:fld>
             <a:endParaRPr lang="ru-RU"/>
           </a:p>
@@ -2507,7 +2507,7 @@
           <a:p>
             <a:fld id="{3FA26C60-B539-465E-BE53-469D770FD957}" type="datetimeFigureOut">
               <a:rPr lang="ru-RU" smtClean="0"/>
-              <a:t>17.09.2018</a:t>
+              <a:t>20.09.2018</a:t>
             </a:fld>
             <a:endParaRPr lang="ru-RU"/>
           </a:p>
@@ -2720,7 +2720,7 @@
           <a:p>
             <a:fld id="{3FA26C60-B539-465E-BE53-469D770FD957}" type="datetimeFigureOut">
               <a:rPr lang="ru-RU" smtClean="0"/>
-              <a:t>17.09.2018</a:t>
+              <a:t>20.09.2018</a:t>
             </a:fld>
             <a:endParaRPr lang="ru-RU"/>
           </a:p>
@@ -3145,7 +3145,7 @@
         </p:nvCxnSpPr>
         <p:spPr>
           <a:xfrm>
-            <a:off x="3563888" y="1484966"/>
+            <a:off x="3563888" y="1980316"/>
             <a:ext cx="0" cy="3106609"/>
           </a:xfrm>
           <a:prstGeom prst="line">
@@ -3185,8 +3185,8 @@
         </p:nvCxnSpPr>
         <p:spPr>
           <a:xfrm>
-            <a:off x="5220072" y="1484966"/>
-            <a:ext cx="0" cy="1486325"/>
+            <a:off x="5220072" y="1966549"/>
+            <a:ext cx="0" cy="1763324"/>
           </a:xfrm>
           <a:prstGeom prst="line">
             <a:avLst/>
@@ -3293,8 +3293,12 @@
                 <a:latin typeface="Arial" pitchFamily="34" charset="0"/>
                 <a:cs typeface="Arial" pitchFamily="34" charset="0"/>
               </a:rPr>
-              <a:t>Home</a:t>
-            </a:r>
+              <a:t>Inicio</a:t>
+            </a:r>
+            <a:endParaRPr lang="es-AR" dirty="0" smtClean="0">
+              <a:latin typeface="Arial" pitchFamily="34" charset="0"/>
+              <a:cs typeface="Arial" pitchFamily="34" charset="0"/>
+            </a:endParaRPr>
           </a:p>
           <a:p>
             <a:pPr algn="ctr"/>
@@ -3342,8 +3346,12 @@
                 <a:latin typeface="Arial" pitchFamily="34" charset="0"/>
                 <a:cs typeface="Arial" pitchFamily="34" charset="0"/>
               </a:rPr>
-              <a:t>POS</a:t>
-            </a:r>
+              <a:t>Caja</a:t>
+            </a:r>
+            <a:endParaRPr lang="es-AR" dirty="0" smtClean="0">
+              <a:latin typeface="Arial" pitchFamily="34" charset="0"/>
+              <a:cs typeface="Arial" pitchFamily="34" charset="0"/>
+            </a:endParaRPr>
           </a:p>
           <a:p>
             <a:pPr algn="ctr"/>
@@ -3391,11 +3399,8 @@
                 <a:latin typeface="Arial" pitchFamily="34" charset="0"/>
                 <a:cs typeface="Arial" pitchFamily="34" charset="0"/>
               </a:rPr>
-              <a:t>Arqueo</a:t>
-            </a:r>
-          </a:p>
-          <a:p>
-            <a:pPr algn="ctr"/>
+              <a:t>Arqueo y Cierre</a:t>
+            </a:r>
             <a:endParaRPr lang="ru-RU" dirty="0">
               <a:latin typeface="Arial" pitchFamily="34" charset="0"/>
               <a:cs typeface="Arial" pitchFamily="34" charset="0"/>
@@ -3457,7 +3462,7 @@
         </p:nvSpPr>
         <p:spPr>
           <a:xfrm>
-            <a:off x="2915816" y="2601960"/>
+            <a:off x="2915816" y="3097310"/>
             <a:ext cx="1296144" cy="646331"/>
           </a:xfrm>
           <a:prstGeom prst="rect">
@@ -3510,7 +3515,7 @@
         </p:nvSpPr>
         <p:spPr>
           <a:xfrm>
-            <a:off x="2915816" y="3571316"/>
+            <a:off x="2915816" y="4066666"/>
             <a:ext cx="1296144" cy="646331"/>
           </a:xfrm>
           <a:prstGeom prst="rect">
@@ -3559,7 +3564,7 @@
         </p:nvSpPr>
         <p:spPr>
           <a:xfrm>
-            <a:off x="2680556" y="4591575"/>
+            <a:off x="2680556" y="5086925"/>
             <a:ext cx="1766664" cy="646331"/>
           </a:xfrm>
           <a:prstGeom prst="rect">
@@ -3609,6 +3614,59 @@
         <p:spPr>
           <a:xfrm>
             <a:off x="4572000" y="1665855"/>
+            <a:ext cx="1296144" cy="923330"/>
+          </a:xfrm>
+          <a:prstGeom prst="rect">
+            <a:avLst/>
+          </a:prstGeom>
+          <a:solidFill>
+            <a:schemeClr val="bg1"/>
+          </a:solidFill>
+          <a:ln w="28575">
+            <a:solidFill>
+              <a:schemeClr val="tx2">
+                <a:lumMod val="75000"/>
+              </a:schemeClr>
+            </a:solidFill>
+          </a:ln>
+        </p:spPr>
+        <p:txBody>
+          <a:bodyPr wrap="square" rtlCol="0">
+            <a:spAutoFit/>
+          </a:bodyPr>
+          <a:lstStyle/>
+          <a:p>
+            <a:pPr algn="ctr"/>
+            <a:r>
+              <a:rPr lang="es-AR" dirty="0" smtClean="0">
+                <a:latin typeface="Arial" pitchFamily="34" charset="0"/>
+                <a:cs typeface="Arial" pitchFamily="34" charset="0"/>
+              </a:rPr>
+              <a:t>Agregar Usuarios</a:t>
+            </a:r>
+            <a:endParaRPr lang="es-AR" dirty="0" smtClean="0">
+              <a:latin typeface="Arial" pitchFamily="34" charset="0"/>
+              <a:cs typeface="Arial" pitchFamily="34" charset="0"/>
+            </a:endParaRPr>
+          </a:p>
+          <a:p>
+            <a:pPr algn="ctr"/>
+            <a:endParaRPr lang="ru-RU" dirty="0">
+              <a:latin typeface="Arial" pitchFamily="34" charset="0"/>
+              <a:cs typeface="Arial" pitchFamily="34" charset="0"/>
+            </a:endParaRPr>
+          </a:p>
+        </p:txBody>
+      </p:sp>
+      <p:sp>
+        <p:nvSpPr>
+          <p:cNvPr id="12" name="TextBox 11"/>
+          <p:cNvSpPr txBox="1"/>
+          <p:nvPr/>
+        </p:nvSpPr>
+        <p:spPr>
+          <a:xfrm>
+            <a:off x="4572000" y="3083542"/>
             <a:ext cx="1296144" cy="646331"/>
           </a:xfrm>
           <a:prstGeom prst="rect">
@@ -3633,92 +3691,11 @@
           <a:p>
             <a:pPr algn="ctr"/>
             <a:r>
-              <a:rPr lang="es-AR" dirty="0" err="1" smtClean="0">
-                <a:latin typeface="Arial" pitchFamily="34" charset="0"/>
-                <a:cs typeface="Arial" pitchFamily="34" charset="0"/>
-              </a:rPr>
-              <a:t>User</a:t>
-            </a:r>
-            <a:r>
               <a:rPr lang="es-AR" dirty="0" smtClean="0">
                 <a:latin typeface="Arial" pitchFamily="34" charset="0"/>
                 <a:cs typeface="Arial" pitchFamily="34" charset="0"/>
               </a:rPr>
-              <a:t> </a:t>
-            </a:r>
-            <a:r>
-              <a:rPr lang="es-AR" dirty="0" err="1" smtClean="0">
-                <a:latin typeface="Arial" pitchFamily="34" charset="0"/>
-                <a:cs typeface="Arial" pitchFamily="34" charset="0"/>
-              </a:rPr>
-              <a:t>Add</a:t>
-            </a:r>
-            <a:endParaRPr lang="es-AR" dirty="0" smtClean="0">
-              <a:latin typeface="Arial" pitchFamily="34" charset="0"/>
-              <a:cs typeface="Arial" pitchFamily="34" charset="0"/>
-            </a:endParaRPr>
-          </a:p>
-          <a:p>
-            <a:pPr algn="ctr"/>
-            <a:endParaRPr lang="ru-RU" dirty="0">
-              <a:latin typeface="Arial" pitchFamily="34" charset="0"/>
-              <a:cs typeface="Arial" pitchFamily="34" charset="0"/>
-            </a:endParaRPr>
-          </a:p>
-        </p:txBody>
-      </p:sp>
-      <p:sp>
-        <p:nvSpPr>
-          <p:cNvPr id="12" name="TextBox 11"/>
-          <p:cNvSpPr txBox="1"/>
-          <p:nvPr/>
-        </p:nvSpPr>
-        <p:spPr>
-          <a:xfrm>
-            <a:off x="4572000" y="2601959"/>
-            <a:ext cx="1296144" cy="369332"/>
-          </a:xfrm>
-          <a:prstGeom prst="rect">
-            <a:avLst/>
-          </a:prstGeom>
-          <a:solidFill>
-            <a:schemeClr val="bg1"/>
-          </a:solidFill>
-          <a:ln w="28575">
-            <a:solidFill>
-              <a:schemeClr val="tx2">
-                <a:lumMod val="75000"/>
-              </a:schemeClr>
-            </a:solidFill>
-          </a:ln>
-        </p:spPr>
-        <p:txBody>
-          <a:bodyPr wrap="square" rtlCol="0">
-            <a:spAutoFit/>
-          </a:bodyPr>
-          <a:lstStyle/>
-          <a:p>
-            <a:pPr algn="ctr"/>
-            <a:r>
-              <a:rPr lang="es-AR" dirty="0" err="1" smtClean="0">
-                <a:latin typeface="Arial" pitchFamily="34" charset="0"/>
-                <a:cs typeface="Arial" pitchFamily="34" charset="0"/>
-              </a:rPr>
-              <a:t>User</a:t>
-            </a:r>
-            <a:r>
-              <a:rPr lang="es-AR" dirty="0" smtClean="0">
-                <a:latin typeface="Arial" pitchFamily="34" charset="0"/>
-                <a:cs typeface="Arial" pitchFamily="34" charset="0"/>
-              </a:rPr>
-              <a:t> </a:t>
-            </a:r>
-            <a:r>
-              <a:rPr lang="es-AR" dirty="0" err="1" smtClean="0">
-                <a:latin typeface="Arial" pitchFamily="34" charset="0"/>
-                <a:cs typeface="Arial" pitchFamily="34" charset="0"/>
-              </a:rPr>
-              <a:t>Mod</a:t>
+              <a:t>Modificar Usuarios</a:t>
             </a:r>
             <a:endParaRPr lang="ru-RU" dirty="0">
               <a:latin typeface="Arial" pitchFamily="34" charset="0"/>
@@ -3828,7 +3805,7 @@
         <p:spPr>
           <a:xfrm>
             <a:off x="1521559" y="2920254"/>
-            <a:ext cx="1394257" cy="4872"/>
+            <a:ext cx="1394257" cy="500222"/>
           </a:xfrm>
           <a:prstGeom prst="line">
             <a:avLst/>
@@ -3865,7 +3842,7 @@
         </p:nvCxnSpPr>
         <p:spPr>
           <a:xfrm>
-            <a:off x="2167786" y="2920253"/>
+            <a:off x="2167786" y="3415603"/>
             <a:ext cx="0" cy="1012984"/>
           </a:xfrm>
           <a:prstGeom prst="line">
@@ -3903,7 +3880,7 @@
         </p:nvCxnSpPr>
         <p:spPr>
           <a:xfrm>
-            <a:off x="2167786" y="3899353"/>
+            <a:off x="2167786" y="4394703"/>
             <a:ext cx="740715" cy="0"/>
           </a:xfrm>
           <a:prstGeom prst="line">
@@ -3942,14 +3919,14 @@
         <p:spPr>
           <a:xfrm>
             <a:off x="539552" y="52449"/>
-            <a:ext cx="3198311" cy="369332"/>
+            <a:ext cx="3456384" cy="646331"/>
           </a:xfrm>
           <a:prstGeom prst="rect">
             <a:avLst/>
           </a:prstGeom>
         </p:spPr>
         <p:txBody>
-          <a:bodyPr wrap="none">
+          <a:bodyPr wrap="square">
             <a:spAutoFit/>
           </a:bodyPr>
           <a:lstStyle/>
@@ -3975,36 +3952,6 @@
               <a:t> POS </a:t>
             </a:r>
             <a:r>
-              <a:rPr lang="es-AR" b="1" dirty="0" err="1" smtClean="0">
-                <a:solidFill>
-                  <a:prstClr val="black"/>
-                </a:solidFill>
-                <a:latin typeface="Arial" pitchFamily="34" charset="0"/>
-                <a:cs typeface="Arial" pitchFamily="34" charset="0"/>
-              </a:rPr>
-              <a:t>Map</a:t>
-            </a:r>
-            <a:r>
-              <a:rPr lang="es-AR" b="1" dirty="0">
-                <a:solidFill>
-                  <a:prstClr val="black"/>
-                </a:solidFill>
-                <a:latin typeface="Arial" pitchFamily="34" charset="0"/>
-                <a:cs typeface="Arial" pitchFamily="34" charset="0"/>
-              </a:rPr>
-              <a:t>.</a:t>
-            </a:r>
-            <a:r>
-              <a:rPr lang="es-AR" b="1" smtClean="0">
-                <a:solidFill>
-                  <a:prstClr val="black"/>
-                </a:solidFill>
-                <a:latin typeface="Arial" pitchFamily="34" charset="0"/>
-                <a:cs typeface="Arial" pitchFamily="34" charset="0"/>
-              </a:rPr>
-              <a:t> </a:t>
-            </a:r>
-            <a:r>
               <a:rPr lang="es-AR" b="1" dirty="0" smtClean="0">
                 <a:solidFill>
                   <a:prstClr val="black"/>
@@ -4012,9 +3959,21 @@
                 <a:latin typeface="Arial" pitchFamily="34" charset="0"/>
                 <a:cs typeface="Arial" pitchFamily="34" charset="0"/>
               </a:rPr>
-              <a:t>1st Fase </a:t>
-            </a:r>
-            <a:endParaRPr lang="ru-RU" b="1" dirty="0"/>
+              <a:t>Mapa.</a:t>
+            </a:r>
+          </a:p>
+          <a:p>
+            <a:r>
+              <a:rPr lang="es-AR" dirty="0" smtClean="0">
+                <a:solidFill>
+                  <a:prstClr val="black"/>
+                </a:solidFill>
+                <a:latin typeface="Arial" pitchFamily="34" charset="0"/>
+                <a:cs typeface="Arial" pitchFamily="34" charset="0"/>
+              </a:rPr>
+              <a:t>Primera Fase</a:t>
+            </a:r>
+            <a:endParaRPr lang="ru-RU" dirty="0"/>
           </a:p>
         </p:txBody>
       </p:sp>

</xml_diff>